<commit_message>
Using an arduino Uno in the irrigation pump card
</commit_message>
<xml_diff>
--- a/Architecture.pptx
+++ b/Architecture.pptx
@@ -104,6 +104,11 @@
       </a:defRPr>
     </a:lvl9pPr>
   </p:defaultTextStyle>
+  <p:extLst>
+    <p:ext uri="{EFAFB233-063F-42B5-8137-9DF3F51BA10A}">
+      <p15:sldGuideLst xmlns:p15="http://schemas.microsoft.com/office/powerpoint/2012/main"/>
+    </p:ext>
+  </p:extLst>
 </p:presentation>
 </file>
 
@@ -157,6 +162,30 @@
       </pc:sldChg>
     </pc:docChg>
   </pc:docChgLst>
+  <pc:docChgLst>
+    <pc:chgData name="Anouar AHMADI" userId="88dcccc7ae0e532f" providerId="LiveId" clId="{935E3519-52C4-4B3D-9525-6E62B12BCECF}"/>
+    <pc:docChg chg="modSld">
+      <pc:chgData name="Anouar AHMADI" userId="88dcccc7ae0e532f" providerId="LiveId" clId="{935E3519-52C4-4B3D-9525-6E62B12BCECF}" dt="2020-04-27T02:59:49.283" v="2" actId="20577"/>
+      <pc:docMkLst>
+        <pc:docMk/>
+      </pc:docMkLst>
+      <pc:sldChg chg="modSp mod">
+        <pc:chgData name="Anouar AHMADI" userId="88dcccc7ae0e532f" providerId="LiveId" clId="{935E3519-52C4-4B3D-9525-6E62B12BCECF}" dt="2020-04-27T02:59:49.283" v="2" actId="20577"/>
+        <pc:sldMkLst>
+          <pc:docMk/>
+          <pc:sldMk cId="1423393702" sldId="256"/>
+        </pc:sldMkLst>
+        <pc:spChg chg="mod">
+          <ac:chgData name="Anouar AHMADI" userId="88dcccc7ae0e532f" providerId="LiveId" clId="{935E3519-52C4-4B3D-9525-6E62B12BCECF}" dt="2020-04-27T02:59:49.283" v="2" actId="20577"/>
+          <ac:spMkLst>
+            <pc:docMk/>
+            <pc:sldMk cId="1423393702" sldId="256"/>
+            <ac:spMk id="13" creationId="{70B24906-DCD5-4FCF-BEEF-957ED5DAF36E}"/>
+          </ac:spMkLst>
+        </pc:spChg>
+      </pc:sldChg>
+    </pc:docChg>
+  </pc:docChgLst>
 </pc:chgInfo>
 </file>
 
@@ -307,7 +336,7 @@
           <a:p>
             <a:fld id="{74242C6F-E9D9-4AAA-904C-D3D3DF58624A}" type="datetimeFigureOut">
               <a:rPr lang="en-US" smtClean="0"/>
-              <a:t>12/25/2019</a:t>
+              <a:t>4/27/2020</a:t>
             </a:fld>
             <a:endParaRPr lang="en-US"/>
           </a:p>
@@ -505,7 +534,7 @@
           <a:p>
             <a:fld id="{74242C6F-E9D9-4AAA-904C-D3D3DF58624A}" type="datetimeFigureOut">
               <a:rPr lang="en-US" smtClean="0"/>
-              <a:t>12/25/2019</a:t>
+              <a:t>4/27/2020</a:t>
             </a:fld>
             <a:endParaRPr lang="en-US"/>
           </a:p>
@@ -713,7 +742,7 @@
           <a:p>
             <a:fld id="{74242C6F-E9D9-4AAA-904C-D3D3DF58624A}" type="datetimeFigureOut">
               <a:rPr lang="en-US" smtClean="0"/>
-              <a:t>12/25/2019</a:t>
+              <a:t>4/27/2020</a:t>
             </a:fld>
             <a:endParaRPr lang="en-US"/>
           </a:p>
@@ -911,7 +940,7 @@
           <a:p>
             <a:fld id="{74242C6F-E9D9-4AAA-904C-D3D3DF58624A}" type="datetimeFigureOut">
               <a:rPr lang="en-US" smtClean="0"/>
-              <a:t>12/25/2019</a:t>
+              <a:t>4/27/2020</a:t>
             </a:fld>
             <a:endParaRPr lang="en-US"/>
           </a:p>
@@ -1186,7 +1215,7 @@
           <a:p>
             <a:fld id="{74242C6F-E9D9-4AAA-904C-D3D3DF58624A}" type="datetimeFigureOut">
               <a:rPr lang="en-US" smtClean="0"/>
-              <a:t>12/25/2019</a:t>
+              <a:t>4/27/2020</a:t>
             </a:fld>
             <a:endParaRPr lang="en-US"/>
           </a:p>
@@ -1451,7 +1480,7 @@
           <a:p>
             <a:fld id="{74242C6F-E9D9-4AAA-904C-D3D3DF58624A}" type="datetimeFigureOut">
               <a:rPr lang="en-US" smtClean="0"/>
-              <a:t>12/25/2019</a:t>
+              <a:t>4/27/2020</a:t>
             </a:fld>
             <a:endParaRPr lang="en-US"/>
           </a:p>
@@ -1863,7 +1892,7 @@
           <a:p>
             <a:fld id="{74242C6F-E9D9-4AAA-904C-D3D3DF58624A}" type="datetimeFigureOut">
               <a:rPr lang="en-US" smtClean="0"/>
-              <a:t>12/25/2019</a:t>
+              <a:t>4/27/2020</a:t>
             </a:fld>
             <a:endParaRPr lang="en-US"/>
           </a:p>
@@ -2004,7 +2033,7 @@
           <a:p>
             <a:fld id="{74242C6F-E9D9-4AAA-904C-D3D3DF58624A}" type="datetimeFigureOut">
               <a:rPr lang="en-US" smtClean="0"/>
-              <a:t>12/25/2019</a:t>
+              <a:t>4/27/2020</a:t>
             </a:fld>
             <a:endParaRPr lang="en-US"/>
           </a:p>
@@ -2117,7 +2146,7 @@
           <a:p>
             <a:fld id="{74242C6F-E9D9-4AAA-904C-D3D3DF58624A}" type="datetimeFigureOut">
               <a:rPr lang="en-US" smtClean="0"/>
-              <a:t>12/25/2019</a:t>
+              <a:t>4/27/2020</a:t>
             </a:fld>
             <a:endParaRPr lang="en-US"/>
           </a:p>
@@ -2428,7 +2457,7 @@
           <a:p>
             <a:fld id="{74242C6F-E9D9-4AAA-904C-D3D3DF58624A}" type="datetimeFigureOut">
               <a:rPr lang="en-US" smtClean="0"/>
-              <a:t>12/25/2019</a:t>
+              <a:t>4/27/2020</a:t>
             </a:fld>
             <a:endParaRPr lang="en-US"/>
           </a:p>
@@ -2716,7 +2745,7 @@
           <a:p>
             <a:fld id="{74242C6F-E9D9-4AAA-904C-D3D3DF58624A}" type="datetimeFigureOut">
               <a:rPr lang="en-US" smtClean="0"/>
-              <a:t>12/25/2019</a:t>
+              <a:t>4/27/2020</a:t>
             </a:fld>
             <a:endParaRPr lang="en-US"/>
           </a:p>
@@ -2957,7 +2986,7 @@
           <a:p>
             <a:fld id="{74242C6F-E9D9-4AAA-904C-D3D3DF58624A}" type="datetimeFigureOut">
               <a:rPr lang="en-US" smtClean="0"/>
-              <a:t>12/25/2019</a:t>
+              <a:t>4/27/2020</a:t>
             </a:fld>
             <a:endParaRPr lang="en-US"/>
           </a:p>
@@ -3870,19 +3899,15 @@
               </a:r>
               <a:r>
                 <a:rPr lang="en-US" dirty="0"/>
-                <a:t>n</a:t>
+                <a:t>U</a:t>
               </a:r>
               <a:r>
                 <a:rPr lang="fr-TN" dirty="0"/>
-                <a:t>a</a:t>
+                <a:t>N</a:t>
               </a:r>
               <a:r>
-                <a:rPr lang="en-US" dirty="0"/>
-                <a:t>n</a:t>
-              </a:r>
-              <a:r>
-                <a:rPr lang="fr-TN" dirty="0"/>
-                <a:t>o</a:t>
+                <a:rPr lang="fr-FR" dirty="0"/>
+                <a:t>O</a:t>
               </a:r>
               <a:endParaRPr lang="en-US" dirty="0"/>
             </a:p>

</xml_diff>